<commit_message>
Updates proposal dry run slides
</commit_message>
<xml_diff>
--- a/docs/slides/Proposal presentation _ dry run.pptx
+++ b/docs/slides/Proposal presentation _ dry run.pptx
@@ -29,13 +29,13 @@
     <p:sldId id="286" r:id="rId17"/>
     <p:sldId id="317" r:id="rId18"/>
     <p:sldId id="320" r:id="rId19"/>
-    <p:sldId id="288" r:id="rId20"/>
-    <p:sldId id="289" r:id="rId21"/>
-    <p:sldId id="290" r:id="rId22"/>
-    <p:sldId id="296" r:id="rId23"/>
-    <p:sldId id="294" r:id="rId24"/>
-    <p:sldId id="295" r:id="rId25"/>
-    <p:sldId id="291" r:id="rId26"/>
+    <p:sldId id="291" r:id="rId20"/>
+    <p:sldId id="288" r:id="rId21"/>
+    <p:sldId id="289" r:id="rId22"/>
+    <p:sldId id="290" r:id="rId23"/>
+    <p:sldId id="296" r:id="rId24"/>
+    <p:sldId id="294" r:id="rId25"/>
+    <p:sldId id="295" r:id="rId26"/>
     <p:sldId id="302" r:id="rId27"/>
     <p:sldId id="304" r:id="rId28"/>
     <p:sldId id="318" r:id="rId29"/>
@@ -32467,7 +32467,7 @@
                   <a:schemeClr val="tx2"/>
                 </a:solidFill>
               </a:rPr>
-              <a:t>Our Approaches</a:t>
+              <a:t>UX Design Cycle</a:t>
             </a:r>
           </a:p>
         </p:txBody>
@@ -32498,124 +32498,6 @@
       </p:sp>
       <p:sp>
         <p:nvSpPr>
-          <p:cNvPr id="5" name="Textplatzhalter 4"/>
-          <p:cNvSpPr>
-            <a:spLocks noGrp="1"/>
-          </p:cNvSpPr>
-          <p:nvPr>
-            <p:ph type="body" sz="quarter" idx="12"/>
-          </p:nvPr>
-        </p:nvSpPr>
-        <p:spPr/>
-        <p:txBody>
-          <a:bodyPr/>
-          <a:lstStyle/>
-          <a:p>
-            <a:endParaRPr lang="de-DE" dirty="0"/>
-          </a:p>
-          <a:p>
-            <a:r>
-              <a:rPr lang="de-DE" dirty="0"/>
-              <a:t>Research Methodology – UX Design Cycle</a:t>
-            </a:r>
-          </a:p>
-          <a:p>
-            <a:endParaRPr lang="de-DE" dirty="0"/>
-          </a:p>
-          <a:p>
-            <a:r>
-              <a:rPr lang="de-DE" dirty="0"/>
-              <a:t>Software Engineering disciplines:</a:t>
-            </a:r>
-            <a:br>
-              <a:rPr lang="de-DE" dirty="0"/>
-            </a:br>
-            <a:endParaRPr lang="de-DE" dirty="0"/>
-          </a:p>
-          <a:p>
-            <a:pPr lvl="4">
-              <a:buFont typeface="Wingdings" panose="05000000000000000000" pitchFamily="2" charset="2"/>
-              <a:buChar char="§"/>
-            </a:pPr>
-            <a:r>
-              <a:rPr lang="de-DE" dirty="0"/>
-              <a:t>Complex datasets</a:t>
-            </a:r>
-          </a:p>
-          <a:p>
-            <a:pPr lvl="4">
-              <a:buFont typeface="Wingdings" panose="05000000000000000000" pitchFamily="2" charset="2"/>
-              <a:buChar char="§"/>
-            </a:pPr>
-            <a:r>
-              <a:rPr lang="de-DE" dirty="0"/>
-              <a:t>Compiler reporting</a:t>
-            </a:r>
-          </a:p>
-          <a:p>
-            <a:pPr lvl="4">
-              <a:buFont typeface="Wingdings" panose="05000000000000000000" pitchFamily="2" charset="2"/>
-              <a:buChar char="§"/>
-            </a:pPr>
-            <a:r>
-              <a:rPr lang="de-DE" dirty="0"/>
-              <a:t>Continuous integration</a:t>
-            </a:r>
-          </a:p>
-          <a:p>
-            <a:pPr lvl="4">
-              <a:buFont typeface="Wingdings" panose="05000000000000000000" pitchFamily="2" charset="2"/>
-              <a:buChar char="§"/>
-            </a:pPr>
-            <a:r>
-              <a:rPr lang="de-DE" dirty="0"/>
-              <a:t>Refactoring tools</a:t>
-            </a:r>
-          </a:p>
-          <a:p>
-            <a:pPr lvl="4">
-              <a:buFont typeface="Wingdings" panose="05000000000000000000" pitchFamily="2" charset="2"/>
-              <a:buChar char="§"/>
-            </a:pPr>
-            <a:r>
-              <a:rPr lang="de-DE" dirty="0"/>
-              <a:t>Issue tracker</a:t>
-            </a:r>
-          </a:p>
-          <a:p>
-            <a:pPr lvl="4">
-              <a:buFont typeface="Wingdings" panose="05000000000000000000" pitchFamily="2" charset="2"/>
-              <a:buChar char="§"/>
-            </a:pPr>
-            <a:r>
-              <a:rPr lang="de-DE" dirty="0"/>
-              <a:t>Stack Overflow </a:t>
-            </a:r>
-          </a:p>
-          <a:p>
-            <a:pPr lvl="4">
-              <a:buFont typeface="Wingdings" panose="05000000000000000000" pitchFamily="2" charset="2"/>
-              <a:buChar char="§"/>
-            </a:pPr>
-            <a:r>
-              <a:rPr lang="de-DE" dirty="0"/>
-              <a:t>Gamification</a:t>
-            </a:r>
-          </a:p>
-          <a:p>
-            <a:pPr lvl="4">
-              <a:buFont typeface="Wingdings" panose="05000000000000000000" pitchFamily="2" charset="2"/>
-              <a:buChar char="§"/>
-            </a:pPr>
-            <a:r>
-              <a:rPr lang="de-DE" dirty="0"/>
-              <a:t>Usability Engineering</a:t>
-            </a:r>
-          </a:p>
-        </p:txBody>
-      </p:sp>
-      <p:sp>
-        <p:nvSpPr>
           <p:cNvPr id="3" name="Fußzeilenplatzhalter 2"/>
           <p:cNvSpPr>
             <a:spLocks noGrp="1"/>
@@ -32637,10 +32519,106 @@
           </a:p>
         </p:txBody>
       </p:sp>
+      <p:pic>
+        <p:nvPicPr>
+          <p:cNvPr id="7" name="Picture 6" descr="A close up of a logo&#10;&#10;Description automatically generated">
+            <a:extLst>
+              <a:ext uri="{FF2B5EF4-FFF2-40B4-BE49-F238E27FC236}">
+                <a16:creationId xmlns:a16="http://schemas.microsoft.com/office/drawing/2014/main" id="{8269BFC5-F04C-47E7-A8B1-51CDB2571100}"/>
+              </a:ext>
+            </a:extLst>
+          </p:cNvPr>
+          <p:cNvPicPr>
+            <a:picLocks noChangeAspect="1"/>
+          </p:cNvPicPr>
+          <p:nvPr/>
+        </p:nvPicPr>
+        <p:blipFill>
+          <a:blip r:embed="rId2">
+            <a:extLst>
+              <a:ext uri="{28A0092B-C50C-407E-A947-70E740481C1C}">
+                <a14:useLocalDpi xmlns:a14="http://schemas.microsoft.com/office/drawing/2010/main" val="0"/>
+              </a:ext>
+            </a:extLst>
+          </a:blip>
+          <a:stretch>
+            <a:fillRect/>
+          </a:stretch>
+        </p:blipFill>
+        <p:spPr>
+          <a:xfrm>
+            <a:off x="2315647" y="2045641"/>
+            <a:ext cx="5011976" cy="4263679"/>
+          </a:xfrm>
+          <a:prstGeom prst="rect">
+            <a:avLst/>
+          </a:prstGeom>
+        </p:spPr>
+      </p:pic>
+      <p:sp>
+        <p:nvSpPr>
+          <p:cNvPr id="5" name="TextBox 4">
+            <a:extLst>
+              <a:ext uri="{FF2B5EF4-FFF2-40B4-BE49-F238E27FC236}">
+                <a16:creationId xmlns:a16="http://schemas.microsoft.com/office/drawing/2014/main" id="{05AD6563-6C23-49EB-9950-B696F5ADF875}"/>
+              </a:ext>
+            </a:extLst>
+          </p:cNvPr>
+          <p:cNvSpPr txBox="1"/>
+          <p:nvPr/>
+        </p:nvSpPr>
+        <p:spPr>
+          <a:xfrm>
+            <a:off x="270900" y="1502301"/>
+            <a:ext cx="2800126" cy="774571"/>
+          </a:xfrm>
+          <a:prstGeom prst="rect">
+            <a:avLst/>
+          </a:prstGeom>
+          <a:noFill/>
+        </p:spPr>
+        <p:txBody>
+          <a:bodyPr wrap="none" lIns="0" rIns="0" rtlCol="0">
+            <a:spAutoFit/>
+          </a:bodyPr>
+          <a:lstStyle/>
+          <a:p>
+            <a:pPr marL="360000" indent="-360000">
+              <a:spcAft>
+                <a:spcPts val="1000"/>
+              </a:spcAft>
+              <a:buClr>
+                <a:schemeClr val="tx2"/>
+              </a:buClr>
+              <a:buSzPct val="80000"/>
+              <a:buFont typeface="Wingdings" panose="05000000000000000000" pitchFamily="2" charset="2"/>
+              <a:buChar char="n"/>
+            </a:pPr>
+            <a:r>
+              <a:rPr lang="de-DE" dirty="0"/>
+              <a:t>Research Methodology </a:t>
+            </a:r>
+          </a:p>
+          <a:p>
+            <a:pPr marL="360000" indent="-360000">
+              <a:spcAft>
+                <a:spcPts val="1000"/>
+              </a:spcAft>
+              <a:buClr>
+                <a:schemeClr val="tx2"/>
+              </a:buClr>
+              <a:buSzPct val="80000"/>
+              <a:buFont typeface="Wingdings" panose="05000000000000000000" pitchFamily="2" charset="2"/>
+              <a:buChar char="n"/>
+            </a:pPr>
+            <a:endParaRPr lang="LID4096" dirty="0" err="1"/>
+          </a:p>
+        </p:txBody>
+      </p:sp>
     </p:spTree>
     <p:extLst>
       <p:ext uri="{BB962C8B-B14F-4D97-AF65-F5344CB8AC3E}">
-        <p14:creationId xmlns:p14="http://schemas.microsoft.com/office/powerpoint/2010/main" val="4265672591"/>
+        <p14:creationId xmlns:p14="http://schemas.microsoft.com/office/powerpoint/2010/main" val="2449660059"/>
       </p:ext>
     </p:extLst>
   </p:cSld>
@@ -32845,6 +32823,221 @@
           <a:bodyPr/>
           <a:lstStyle/>
           <a:p>
+            <a:pPr marL="0" indent="0">
+              <a:buNone/>
+            </a:pPr>
+            <a:endParaRPr lang="de-DE" dirty="0"/>
+          </a:p>
+          <a:p>
+            <a:r>
+              <a:rPr lang="de-DE" dirty="0"/>
+              <a:t>Software Engineering disciplines:</a:t>
+            </a:r>
+            <a:br>
+              <a:rPr lang="de-DE" dirty="0"/>
+            </a:br>
+            <a:endParaRPr lang="de-DE" dirty="0"/>
+          </a:p>
+          <a:p>
+            <a:pPr lvl="4">
+              <a:buFont typeface="Wingdings" panose="05000000000000000000" pitchFamily="2" charset="2"/>
+              <a:buChar char="§"/>
+            </a:pPr>
+            <a:r>
+              <a:rPr lang="de-DE" dirty="0"/>
+              <a:t>Complex datasets</a:t>
+            </a:r>
+          </a:p>
+          <a:p>
+            <a:pPr lvl="4">
+              <a:buFont typeface="Wingdings" panose="05000000000000000000" pitchFamily="2" charset="2"/>
+              <a:buChar char="§"/>
+            </a:pPr>
+            <a:r>
+              <a:rPr lang="de-DE" dirty="0"/>
+              <a:t>Compiler reporting</a:t>
+            </a:r>
+          </a:p>
+          <a:p>
+            <a:pPr lvl="4">
+              <a:buFont typeface="Wingdings" panose="05000000000000000000" pitchFamily="2" charset="2"/>
+              <a:buChar char="§"/>
+            </a:pPr>
+            <a:r>
+              <a:rPr lang="de-DE" dirty="0"/>
+              <a:t>Continuous integration</a:t>
+            </a:r>
+          </a:p>
+          <a:p>
+            <a:pPr lvl="4">
+              <a:buFont typeface="Wingdings" panose="05000000000000000000" pitchFamily="2" charset="2"/>
+              <a:buChar char="§"/>
+            </a:pPr>
+            <a:r>
+              <a:rPr lang="de-DE" dirty="0"/>
+              <a:t>Refactoring tools</a:t>
+            </a:r>
+          </a:p>
+          <a:p>
+            <a:pPr lvl="4">
+              <a:buFont typeface="Wingdings" panose="05000000000000000000" pitchFamily="2" charset="2"/>
+              <a:buChar char="§"/>
+            </a:pPr>
+            <a:r>
+              <a:rPr lang="de-DE" dirty="0"/>
+              <a:t>Issue tracker</a:t>
+            </a:r>
+          </a:p>
+          <a:p>
+            <a:pPr lvl="4">
+              <a:buFont typeface="Wingdings" panose="05000000000000000000" pitchFamily="2" charset="2"/>
+              <a:buChar char="§"/>
+            </a:pPr>
+            <a:r>
+              <a:rPr lang="de-DE" dirty="0"/>
+              <a:t>Stack Overflow </a:t>
+            </a:r>
+          </a:p>
+          <a:p>
+            <a:pPr lvl="4">
+              <a:buFont typeface="Wingdings" panose="05000000000000000000" pitchFamily="2" charset="2"/>
+              <a:buChar char="§"/>
+            </a:pPr>
+            <a:r>
+              <a:rPr lang="de-DE" dirty="0"/>
+              <a:t>Gamification</a:t>
+            </a:r>
+          </a:p>
+          <a:p>
+            <a:pPr lvl="4">
+              <a:buFont typeface="Wingdings" panose="05000000000000000000" pitchFamily="2" charset="2"/>
+              <a:buChar char="§"/>
+            </a:pPr>
+            <a:r>
+              <a:rPr lang="de-DE" dirty="0"/>
+              <a:t>Usability Engineering</a:t>
+            </a:r>
+          </a:p>
+        </p:txBody>
+      </p:sp>
+      <p:sp>
+        <p:nvSpPr>
+          <p:cNvPr id="3" name="Fußzeilenplatzhalter 2"/>
+          <p:cNvSpPr>
+            <a:spLocks noGrp="1"/>
+          </p:cNvSpPr>
+          <p:nvPr>
+            <p:ph type="ftr" sz="quarter" idx="10"/>
+          </p:nvPr>
+        </p:nvSpPr>
+        <p:spPr/>
+        <p:txBody>
+          <a:bodyPr/>
+          <a:lstStyle/>
+          <a:p>
+            <a:r>
+              <a:rPr lang="de-DE"/>
+              <a:t>Software Engineering</a:t>
+            </a:r>
+            <a:endParaRPr lang="de-DE" dirty="0"/>
+          </a:p>
+        </p:txBody>
+      </p:sp>
+    </p:spTree>
+    <p:extLst>
+      <p:ext uri="{BB962C8B-B14F-4D97-AF65-F5344CB8AC3E}">
+        <p14:creationId xmlns:p14="http://schemas.microsoft.com/office/powerpoint/2010/main" val="4265672591"/>
+      </p:ext>
+    </p:extLst>
+  </p:cSld>
+  <p:clrMapOvr>
+    <a:masterClrMapping/>
+  </p:clrMapOvr>
+</p:sld>
+</file>
+
+<file path=ppt/slides/slide21.xml><?xml version="1.0" encoding="utf-8"?>
+<p:sld xmlns:a="http://schemas.openxmlformats.org/drawingml/2006/main" xmlns:r="http://schemas.openxmlformats.org/officeDocument/2006/relationships" xmlns:p="http://schemas.openxmlformats.org/presentationml/2006/main">
+  <p:cSld>
+    <p:spTree>
+      <p:nvGrpSpPr>
+        <p:cNvPr id="1" name=""/>
+        <p:cNvGrpSpPr/>
+        <p:nvPr/>
+      </p:nvGrpSpPr>
+      <p:grpSpPr>
+        <a:xfrm>
+          <a:off x="0" y="0"/>
+          <a:ext cx="0" cy="0"/>
+          <a:chOff x="0" y="0"/>
+          <a:chExt cx="0" cy="0"/>
+        </a:xfrm>
+      </p:grpSpPr>
+      <p:sp>
+        <p:nvSpPr>
+          <p:cNvPr id="2" name="Titel 1"/>
+          <p:cNvSpPr>
+            <a:spLocks noGrp="1"/>
+          </p:cNvSpPr>
+          <p:nvPr>
+            <p:ph type="title"/>
+          </p:nvPr>
+        </p:nvSpPr>
+        <p:spPr/>
+        <p:txBody>
+          <a:bodyPr/>
+          <a:lstStyle/>
+          <a:p>
+            <a:r>
+              <a:rPr lang="de-DE" dirty="0">
+                <a:solidFill>
+                  <a:schemeClr val="tx2"/>
+                </a:solidFill>
+              </a:rPr>
+              <a:t>Our Approaches</a:t>
+            </a:r>
+          </a:p>
+        </p:txBody>
+      </p:sp>
+      <p:sp>
+        <p:nvSpPr>
+          <p:cNvPr id="4" name="Foliennummernplatzhalter 3"/>
+          <p:cNvSpPr>
+            <a:spLocks noGrp="1"/>
+          </p:cNvSpPr>
+          <p:nvPr>
+            <p:ph type="sldNum" sz="quarter" idx="11"/>
+          </p:nvPr>
+        </p:nvSpPr>
+        <p:spPr/>
+        <p:txBody>
+          <a:bodyPr/>
+          <a:lstStyle/>
+          <a:p>
+            <a:fld id="{815DB69B-0A2B-4D0B-A3BD-360AAA24381D}" type="slidenum">
+              <a:rPr lang="de-DE" smtClean="0"/>
+              <a:pPr/>
+              <a:t>21</a:t>
+            </a:fld>
+            <a:endParaRPr lang="de-DE" dirty="0"/>
+          </a:p>
+        </p:txBody>
+      </p:sp>
+      <p:sp>
+        <p:nvSpPr>
+          <p:cNvPr id="5" name="Textplatzhalter 4"/>
+          <p:cNvSpPr>
+            <a:spLocks noGrp="1"/>
+          </p:cNvSpPr>
+          <p:nvPr>
+            <p:ph type="body" sz="quarter" idx="12"/>
+          </p:nvPr>
+        </p:nvSpPr>
+        <p:spPr/>
+        <p:txBody>
+          <a:bodyPr/>
+          <a:lstStyle/>
+          <a:p>
             <a:r>
               <a:rPr lang="de-DE" dirty="0"/>
               <a:t>Complex datasets:</a:t>
@@ -33019,231 +33212,116 @@
           </a:prstGeom>
         </p:spPr>
       </p:pic>
+      <p:sp>
+        <p:nvSpPr>
+          <p:cNvPr id="6" name="TextBox 5">
+            <a:extLst>
+              <a:ext uri="{FF2B5EF4-FFF2-40B4-BE49-F238E27FC236}">
+                <a16:creationId xmlns:a16="http://schemas.microsoft.com/office/drawing/2014/main" id="{8F3D827D-699E-436B-ACD2-FC80589A8D77}"/>
+              </a:ext>
+            </a:extLst>
+          </p:cNvPr>
+          <p:cNvSpPr txBox="1"/>
+          <p:nvPr/>
+        </p:nvSpPr>
+        <p:spPr>
+          <a:xfrm>
+            <a:off x="6166918" y="3455749"/>
+            <a:ext cx="538609" cy="369332"/>
+          </a:xfrm>
+          <a:prstGeom prst="rect">
+            <a:avLst/>
+          </a:prstGeom>
+          <a:noFill/>
+        </p:spPr>
+        <p:txBody>
+          <a:bodyPr wrap="none" lIns="0" rIns="0" rtlCol="0">
+            <a:spAutoFit/>
+          </a:bodyPr>
+          <a:lstStyle/>
+          <a:p>
+            <a:pPr>
+              <a:spcAft>
+                <a:spcPts val="1000"/>
+              </a:spcAft>
+              <a:buClr>
+                <a:schemeClr val="tx2"/>
+              </a:buClr>
+              <a:buSzPct val="80000"/>
+            </a:pPr>
+            <a:r>
+              <a:rPr lang="en-GB" b="1" dirty="0">
+                <a:solidFill>
+                  <a:srgbClr val="00B050"/>
+                </a:solidFill>
+              </a:rPr>
+              <a:t>RQ 1</a:t>
+            </a:r>
+            <a:endParaRPr lang="LID4096" b="1" dirty="0" err="1">
+              <a:solidFill>
+                <a:srgbClr val="00B050"/>
+              </a:solidFill>
+            </a:endParaRPr>
+          </a:p>
+        </p:txBody>
+      </p:sp>
+      <p:sp>
+        <p:nvSpPr>
+          <p:cNvPr id="9" name="TextBox 8">
+            <a:extLst>
+              <a:ext uri="{FF2B5EF4-FFF2-40B4-BE49-F238E27FC236}">
+                <a16:creationId xmlns:a16="http://schemas.microsoft.com/office/drawing/2014/main" id="{86DD756B-018E-48B1-A599-9AF56BAB01A1}"/>
+              </a:ext>
+            </a:extLst>
+          </p:cNvPr>
+          <p:cNvSpPr txBox="1"/>
+          <p:nvPr/>
+        </p:nvSpPr>
+        <p:spPr>
+          <a:xfrm>
+            <a:off x="4917165" y="5966529"/>
+            <a:ext cx="538609" cy="369332"/>
+          </a:xfrm>
+          <a:prstGeom prst="rect">
+            <a:avLst/>
+          </a:prstGeom>
+          <a:noFill/>
+        </p:spPr>
+        <p:txBody>
+          <a:bodyPr wrap="none" lIns="0" rIns="0" rtlCol="0">
+            <a:spAutoFit/>
+          </a:bodyPr>
+          <a:lstStyle/>
+          <a:p>
+            <a:pPr>
+              <a:spcAft>
+                <a:spcPts val="1000"/>
+              </a:spcAft>
+              <a:buClr>
+                <a:schemeClr val="tx2"/>
+              </a:buClr>
+              <a:buSzPct val="80000"/>
+            </a:pPr>
+            <a:r>
+              <a:rPr lang="en-GB" b="1" dirty="0">
+                <a:solidFill>
+                  <a:srgbClr val="00B050"/>
+                </a:solidFill>
+              </a:rPr>
+              <a:t>RQ 2</a:t>
+            </a:r>
+            <a:endParaRPr lang="LID4096" b="1" dirty="0" err="1">
+              <a:solidFill>
+                <a:srgbClr val="00B050"/>
+              </a:solidFill>
+            </a:endParaRPr>
+          </a:p>
+        </p:txBody>
+      </p:sp>
     </p:spTree>
     <p:extLst>
       <p:ext uri="{BB962C8B-B14F-4D97-AF65-F5344CB8AC3E}">
         <p14:creationId xmlns:p14="http://schemas.microsoft.com/office/powerpoint/2010/main" val="693282793"/>
-      </p:ext>
-    </p:extLst>
-  </p:cSld>
-  <p:clrMapOvr>
-    <a:masterClrMapping/>
-  </p:clrMapOvr>
-</p:sld>
-</file>
-
-<file path=ppt/slides/slide21.xml><?xml version="1.0" encoding="utf-8"?>
-<p:sld xmlns:a="http://schemas.openxmlformats.org/drawingml/2006/main" xmlns:r="http://schemas.openxmlformats.org/officeDocument/2006/relationships" xmlns:p="http://schemas.openxmlformats.org/presentationml/2006/main">
-  <p:cSld>
-    <p:spTree>
-      <p:nvGrpSpPr>
-        <p:cNvPr id="1" name=""/>
-        <p:cNvGrpSpPr/>
-        <p:nvPr/>
-      </p:nvGrpSpPr>
-      <p:grpSpPr>
-        <a:xfrm>
-          <a:off x="0" y="0"/>
-          <a:ext cx="0" cy="0"/>
-          <a:chOff x="0" y="0"/>
-          <a:chExt cx="0" cy="0"/>
-        </a:xfrm>
-      </p:grpSpPr>
-      <p:sp>
-        <p:nvSpPr>
-          <p:cNvPr id="2" name="Titel 1"/>
-          <p:cNvSpPr>
-            <a:spLocks noGrp="1"/>
-          </p:cNvSpPr>
-          <p:nvPr>
-            <p:ph type="title"/>
-          </p:nvPr>
-        </p:nvSpPr>
-        <p:spPr/>
-        <p:txBody>
-          <a:bodyPr/>
-          <a:lstStyle/>
-          <a:p>
-            <a:r>
-              <a:rPr lang="de-DE" dirty="0">
-                <a:solidFill>
-                  <a:schemeClr val="tx2"/>
-                </a:solidFill>
-              </a:rPr>
-              <a:t>Our Approaches</a:t>
-            </a:r>
-          </a:p>
-        </p:txBody>
-      </p:sp>
-      <p:sp>
-        <p:nvSpPr>
-          <p:cNvPr id="4" name="Foliennummernplatzhalter 3"/>
-          <p:cNvSpPr>
-            <a:spLocks noGrp="1"/>
-          </p:cNvSpPr>
-          <p:nvPr>
-            <p:ph type="sldNum" sz="quarter" idx="11"/>
-          </p:nvPr>
-        </p:nvSpPr>
-        <p:spPr/>
-        <p:txBody>
-          <a:bodyPr/>
-          <a:lstStyle/>
-          <a:p>
-            <a:fld id="{815DB69B-0A2B-4D0B-A3BD-360AAA24381D}" type="slidenum">
-              <a:rPr lang="de-DE" smtClean="0"/>
-              <a:pPr/>
-              <a:t>21</a:t>
-            </a:fld>
-            <a:endParaRPr lang="de-DE" dirty="0"/>
-          </a:p>
-        </p:txBody>
-      </p:sp>
-      <p:sp>
-        <p:nvSpPr>
-          <p:cNvPr id="5" name="Textplatzhalter 4"/>
-          <p:cNvSpPr>
-            <a:spLocks noGrp="1"/>
-          </p:cNvSpPr>
-          <p:nvPr>
-            <p:ph type="body" sz="quarter" idx="12"/>
-          </p:nvPr>
-        </p:nvSpPr>
-        <p:spPr/>
-        <p:txBody>
-          <a:bodyPr/>
-          <a:lstStyle/>
-          <a:p>
-            <a:r>
-              <a:rPr lang="de-DE" dirty="0"/>
-              <a:t>Compiler reporting</a:t>
-            </a:r>
-          </a:p>
-          <a:p>
-            <a:endParaRPr lang="de-DE" dirty="0"/>
-          </a:p>
-          <a:p>
-            <a:endParaRPr lang="de-DE" dirty="0"/>
-          </a:p>
-          <a:p>
-            <a:pPr marL="0" indent="0">
-              <a:buNone/>
-            </a:pPr>
-            <a:r>
-              <a:rPr lang="en-GB" dirty="0"/>
-              <a:t>Horning et. al </a:t>
-            </a:r>
-          </a:p>
-          <a:p>
-            <a:pPr marL="0" indent="0">
-              <a:buNone/>
-            </a:pPr>
-            <a:endParaRPr lang="en-GB" dirty="0"/>
-          </a:p>
-          <a:p>
-            <a:pPr>
-              <a:buFontTx/>
-              <a:buChar char="-"/>
-            </a:pPr>
-            <a:r>
-              <a:rPr lang="en-GB" dirty="0"/>
-              <a:t>error logging with statistics </a:t>
-            </a:r>
-          </a:p>
-          <a:p>
-            <a:pPr marL="0" indent="0">
-              <a:buNone/>
-            </a:pPr>
-            <a:endParaRPr lang="en-GB" dirty="0"/>
-          </a:p>
-          <a:p>
-            <a:pPr>
-              <a:buFontTx/>
-              <a:buChar char="-"/>
-            </a:pPr>
-            <a:r>
-              <a:rPr lang="en-GB" dirty="0"/>
-              <a:t>stating what kind of bugs are not found along with bugs found</a:t>
-            </a:r>
-            <a:endParaRPr lang="de-DE" dirty="0"/>
-          </a:p>
-          <a:p>
-            <a:endParaRPr lang="de-DE" dirty="0"/>
-          </a:p>
-          <a:p>
-            <a:pPr marL="0" indent="0">
-              <a:buNone/>
-            </a:pPr>
-            <a:endParaRPr lang="de-DE" dirty="0"/>
-          </a:p>
-          <a:p>
-            <a:endParaRPr lang="de-DE" dirty="0"/>
-          </a:p>
-        </p:txBody>
-      </p:sp>
-      <p:sp>
-        <p:nvSpPr>
-          <p:cNvPr id="3" name="Fußzeilenplatzhalter 2"/>
-          <p:cNvSpPr>
-            <a:spLocks noGrp="1"/>
-          </p:cNvSpPr>
-          <p:nvPr>
-            <p:ph type="ftr" sz="quarter" idx="10"/>
-          </p:nvPr>
-        </p:nvSpPr>
-        <p:spPr/>
-        <p:txBody>
-          <a:bodyPr/>
-          <a:lstStyle/>
-          <a:p>
-            <a:r>
-              <a:rPr lang="de-DE"/>
-              <a:t>Software Engineering</a:t>
-            </a:r>
-            <a:endParaRPr lang="de-DE" dirty="0"/>
-          </a:p>
-        </p:txBody>
-      </p:sp>
-      <p:pic>
-        <p:nvPicPr>
-          <p:cNvPr id="6" name="Picture 5" descr="A close up of a logo&#10;&#10;Description automatically generated">
-            <a:extLst>
-              <a:ext uri="{FF2B5EF4-FFF2-40B4-BE49-F238E27FC236}">
-                <a16:creationId xmlns:a16="http://schemas.microsoft.com/office/drawing/2014/main" id="{A7A020AF-72D7-4F42-A419-633515EC45C5}"/>
-              </a:ext>
-            </a:extLst>
-          </p:cNvPr>
-          <p:cNvPicPr>
-            <a:picLocks noChangeAspect="1"/>
-          </p:cNvPicPr>
-          <p:nvPr/>
-        </p:nvPicPr>
-        <p:blipFill>
-          <a:blip r:embed="rId2" cstate="print">
-            <a:extLst>
-              <a:ext uri="{28A0092B-C50C-407E-A947-70E740481C1C}">
-                <a14:useLocalDpi xmlns:a14="http://schemas.microsoft.com/office/drawing/2010/main" val="0"/>
-              </a:ext>
-            </a:extLst>
-          </a:blip>
-          <a:stretch>
-            <a:fillRect/>
-          </a:stretch>
-        </p:blipFill>
-        <p:spPr>
-          <a:xfrm>
-            <a:off x="3656856" y="2541771"/>
-            <a:ext cx="1169574" cy="1383987"/>
-          </a:xfrm>
-          <a:prstGeom prst="rect">
-            <a:avLst/>
-          </a:prstGeom>
-        </p:spPr>
-      </p:pic>
-    </p:spTree>
-    <p:extLst>
-      <p:ext uri="{BB962C8B-B14F-4D97-AF65-F5344CB8AC3E}">
-        <p14:creationId xmlns:p14="http://schemas.microsoft.com/office/powerpoint/2010/main" val="648326557"/>
       </p:ext>
     </p:extLst>
   </p:cSld>
@@ -33315,6 +33393,280 @@
               <a:rPr lang="de-DE" smtClean="0"/>
               <a:pPr/>
               <a:t>22</a:t>
+            </a:fld>
+            <a:endParaRPr lang="de-DE" dirty="0"/>
+          </a:p>
+        </p:txBody>
+      </p:sp>
+      <p:sp>
+        <p:nvSpPr>
+          <p:cNvPr id="5" name="Textplatzhalter 4"/>
+          <p:cNvSpPr>
+            <a:spLocks noGrp="1"/>
+          </p:cNvSpPr>
+          <p:nvPr>
+            <p:ph type="body" sz="quarter" idx="12"/>
+          </p:nvPr>
+        </p:nvSpPr>
+        <p:spPr/>
+        <p:txBody>
+          <a:bodyPr/>
+          <a:lstStyle/>
+          <a:p>
+            <a:r>
+              <a:rPr lang="de-DE" dirty="0"/>
+              <a:t>Compiler reporting</a:t>
+            </a:r>
+          </a:p>
+          <a:p>
+            <a:endParaRPr lang="de-DE" dirty="0"/>
+          </a:p>
+          <a:p>
+            <a:endParaRPr lang="de-DE" dirty="0"/>
+          </a:p>
+          <a:p>
+            <a:pPr marL="0" indent="0">
+              <a:buNone/>
+            </a:pPr>
+            <a:r>
+              <a:rPr lang="en-GB" dirty="0"/>
+              <a:t>Horning et. al </a:t>
+            </a:r>
+          </a:p>
+          <a:p>
+            <a:pPr marL="0" indent="0">
+              <a:buNone/>
+            </a:pPr>
+            <a:endParaRPr lang="en-GB" dirty="0"/>
+          </a:p>
+          <a:p>
+            <a:pPr>
+              <a:buFontTx/>
+              <a:buChar char="-"/>
+            </a:pPr>
+            <a:r>
+              <a:rPr lang="en-GB" dirty="0"/>
+              <a:t>error logging with statistics </a:t>
+            </a:r>
+          </a:p>
+          <a:p>
+            <a:pPr marL="0" indent="0">
+              <a:buNone/>
+            </a:pPr>
+            <a:endParaRPr lang="en-GB" dirty="0"/>
+          </a:p>
+          <a:p>
+            <a:pPr>
+              <a:buFontTx/>
+              <a:buChar char="-"/>
+            </a:pPr>
+            <a:r>
+              <a:rPr lang="en-GB" dirty="0"/>
+              <a:t>stating what kind of bugs are not found along with bugs found</a:t>
+            </a:r>
+            <a:endParaRPr lang="de-DE" dirty="0"/>
+          </a:p>
+          <a:p>
+            <a:endParaRPr lang="de-DE" dirty="0"/>
+          </a:p>
+          <a:p>
+            <a:pPr marL="0" indent="0">
+              <a:buNone/>
+            </a:pPr>
+            <a:endParaRPr lang="de-DE" dirty="0"/>
+          </a:p>
+          <a:p>
+            <a:endParaRPr lang="de-DE" dirty="0"/>
+          </a:p>
+        </p:txBody>
+      </p:sp>
+      <p:sp>
+        <p:nvSpPr>
+          <p:cNvPr id="3" name="Fußzeilenplatzhalter 2"/>
+          <p:cNvSpPr>
+            <a:spLocks noGrp="1"/>
+          </p:cNvSpPr>
+          <p:nvPr>
+            <p:ph type="ftr" sz="quarter" idx="10"/>
+          </p:nvPr>
+        </p:nvSpPr>
+        <p:spPr/>
+        <p:txBody>
+          <a:bodyPr/>
+          <a:lstStyle/>
+          <a:p>
+            <a:r>
+              <a:rPr lang="de-DE"/>
+              <a:t>Software Engineering</a:t>
+            </a:r>
+            <a:endParaRPr lang="de-DE" dirty="0"/>
+          </a:p>
+        </p:txBody>
+      </p:sp>
+      <p:pic>
+        <p:nvPicPr>
+          <p:cNvPr id="6" name="Picture 5" descr="A close up of a logo&#10;&#10;Description automatically generated">
+            <a:extLst>
+              <a:ext uri="{FF2B5EF4-FFF2-40B4-BE49-F238E27FC236}">
+                <a16:creationId xmlns:a16="http://schemas.microsoft.com/office/drawing/2014/main" id="{A7A020AF-72D7-4F42-A419-633515EC45C5}"/>
+              </a:ext>
+            </a:extLst>
+          </p:cNvPr>
+          <p:cNvPicPr>
+            <a:picLocks noChangeAspect="1"/>
+          </p:cNvPicPr>
+          <p:nvPr/>
+        </p:nvPicPr>
+        <p:blipFill>
+          <a:blip r:embed="rId2" cstate="print">
+            <a:extLst>
+              <a:ext uri="{28A0092B-C50C-407E-A947-70E740481C1C}">
+                <a14:useLocalDpi xmlns:a14="http://schemas.microsoft.com/office/drawing/2010/main" val="0"/>
+              </a:ext>
+            </a:extLst>
+          </a:blip>
+          <a:stretch>
+            <a:fillRect/>
+          </a:stretch>
+        </p:blipFill>
+        <p:spPr>
+          <a:xfrm>
+            <a:off x="3656856" y="2541771"/>
+            <a:ext cx="1169574" cy="1383987"/>
+          </a:xfrm>
+          <a:prstGeom prst="rect">
+            <a:avLst/>
+          </a:prstGeom>
+        </p:spPr>
+      </p:pic>
+      <p:sp>
+        <p:nvSpPr>
+          <p:cNvPr id="7" name="TextBox 6">
+            <a:extLst>
+              <a:ext uri="{FF2B5EF4-FFF2-40B4-BE49-F238E27FC236}">
+                <a16:creationId xmlns:a16="http://schemas.microsoft.com/office/drawing/2014/main" id="{6BB21ED6-4A8E-493A-8ACF-D99A2089DC68}"/>
+              </a:ext>
+            </a:extLst>
+          </p:cNvPr>
+          <p:cNvSpPr txBox="1"/>
+          <p:nvPr/>
+        </p:nvSpPr>
+        <p:spPr>
+          <a:xfrm>
+            <a:off x="4557125" y="3452231"/>
+            <a:ext cx="538609" cy="369332"/>
+          </a:xfrm>
+          <a:prstGeom prst="rect">
+            <a:avLst/>
+          </a:prstGeom>
+          <a:noFill/>
+        </p:spPr>
+        <p:txBody>
+          <a:bodyPr wrap="none" lIns="0" rIns="0" rtlCol="0">
+            <a:spAutoFit/>
+          </a:bodyPr>
+          <a:lstStyle/>
+          <a:p>
+            <a:pPr>
+              <a:spcAft>
+                <a:spcPts val="1000"/>
+              </a:spcAft>
+              <a:buClr>
+                <a:schemeClr val="tx2"/>
+              </a:buClr>
+              <a:buSzPct val="80000"/>
+            </a:pPr>
+            <a:r>
+              <a:rPr lang="en-GB" b="1" dirty="0">
+                <a:solidFill>
+                  <a:srgbClr val="00B050"/>
+                </a:solidFill>
+              </a:rPr>
+              <a:t>RQ 1</a:t>
+            </a:r>
+            <a:endParaRPr lang="LID4096" b="1" dirty="0" err="1">
+              <a:solidFill>
+                <a:srgbClr val="00B050"/>
+              </a:solidFill>
+            </a:endParaRPr>
+          </a:p>
+        </p:txBody>
+      </p:sp>
+    </p:spTree>
+    <p:extLst>
+      <p:ext uri="{BB962C8B-B14F-4D97-AF65-F5344CB8AC3E}">
+        <p14:creationId xmlns:p14="http://schemas.microsoft.com/office/powerpoint/2010/main" val="648326557"/>
+      </p:ext>
+    </p:extLst>
+  </p:cSld>
+  <p:clrMapOvr>
+    <a:masterClrMapping/>
+  </p:clrMapOvr>
+</p:sld>
+</file>
+
+<file path=ppt/slides/slide23.xml><?xml version="1.0" encoding="utf-8"?>
+<p:sld xmlns:a="http://schemas.openxmlformats.org/drawingml/2006/main" xmlns:r="http://schemas.openxmlformats.org/officeDocument/2006/relationships" xmlns:p="http://schemas.openxmlformats.org/presentationml/2006/main">
+  <p:cSld>
+    <p:spTree>
+      <p:nvGrpSpPr>
+        <p:cNvPr id="1" name=""/>
+        <p:cNvGrpSpPr/>
+        <p:nvPr/>
+      </p:nvGrpSpPr>
+      <p:grpSpPr>
+        <a:xfrm>
+          <a:off x="0" y="0"/>
+          <a:ext cx="0" cy="0"/>
+          <a:chOff x="0" y="0"/>
+          <a:chExt cx="0" cy="0"/>
+        </a:xfrm>
+      </p:grpSpPr>
+      <p:sp>
+        <p:nvSpPr>
+          <p:cNvPr id="2" name="Titel 1"/>
+          <p:cNvSpPr>
+            <a:spLocks noGrp="1"/>
+          </p:cNvSpPr>
+          <p:nvPr>
+            <p:ph type="title"/>
+          </p:nvPr>
+        </p:nvSpPr>
+        <p:spPr/>
+        <p:txBody>
+          <a:bodyPr/>
+          <a:lstStyle/>
+          <a:p>
+            <a:r>
+              <a:rPr lang="de-DE" dirty="0">
+                <a:solidFill>
+                  <a:schemeClr val="tx2"/>
+                </a:solidFill>
+              </a:rPr>
+              <a:t>Our Approaches</a:t>
+            </a:r>
+          </a:p>
+        </p:txBody>
+      </p:sp>
+      <p:sp>
+        <p:nvSpPr>
+          <p:cNvPr id="4" name="Foliennummernplatzhalter 3"/>
+          <p:cNvSpPr>
+            <a:spLocks noGrp="1"/>
+          </p:cNvSpPr>
+          <p:nvPr>
+            <p:ph type="sldNum" sz="quarter" idx="11"/>
+          </p:nvPr>
+        </p:nvSpPr>
+        <p:spPr/>
+        <p:txBody>
+          <a:bodyPr/>
+          <a:lstStyle/>
+          <a:p>
+            <a:fld id="{815DB69B-0A2B-4D0B-A3BD-360AAA24381D}" type="slidenum">
+              <a:rPr lang="de-DE" smtClean="0"/>
+              <a:pPr/>
+              <a:t>23</a:t>
             </a:fld>
             <a:endParaRPr lang="de-DE" dirty="0"/>
           </a:p>
@@ -33514,232 +33866,116 @@
           </a:prstGeom>
         </p:spPr>
       </p:pic>
+      <p:sp>
+        <p:nvSpPr>
+          <p:cNvPr id="8" name="TextBox 7">
+            <a:extLst>
+              <a:ext uri="{FF2B5EF4-FFF2-40B4-BE49-F238E27FC236}">
+                <a16:creationId xmlns:a16="http://schemas.microsoft.com/office/drawing/2014/main" id="{2A382B04-71BC-4C99-9255-B364CECC4A15}"/>
+              </a:ext>
+            </a:extLst>
+          </p:cNvPr>
+          <p:cNvSpPr txBox="1"/>
+          <p:nvPr/>
+        </p:nvSpPr>
+        <p:spPr>
+          <a:xfrm>
+            <a:off x="6933389" y="3741093"/>
+            <a:ext cx="538609" cy="369332"/>
+          </a:xfrm>
+          <a:prstGeom prst="rect">
+            <a:avLst/>
+          </a:prstGeom>
+          <a:noFill/>
+        </p:spPr>
+        <p:txBody>
+          <a:bodyPr wrap="none" lIns="0" rIns="0" rtlCol="0">
+            <a:spAutoFit/>
+          </a:bodyPr>
+          <a:lstStyle/>
+          <a:p>
+            <a:pPr>
+              <a:spcAft>
+                <a:spcPts val="1000"/>
+              </a:spcAft>
+              <a:buClr>
+                <a:schemeClr val="tx2"/>
+              </a:buClr>
+              <a:buSzPct val="80000"/>
+            </a:pPr>
+            <a:r>
+              <a:rPr lang="en-GB" b="1" dirty="0">
+                <a:solidFill>
+                  <a:srgbClr val="00B050"/>
+                </a:solidFill>
+              </a:rPr>
+              <a:t>RQ 3</a:t>
+            </a:r>
+            <a:endParaRPr lang="LID4096" b="1" dirty="0" err="1">
+              <a:solidFill>
+                <a:srgbClr val="00B050"/>
+              </a:solidFill>
+            </a:endParaRPr>
+          </a:p>
+        </p:txBody>
+      </p:sp>
+      <p:sp>
+        <p:nvSpPr>
+          <p:cNvPr id="9" name="TextBox 8">
+            <a:extLst>
+              <a:ext uri="{FF2B5EF4-FFF2-40B4-BE49-F238E27FC236}">
+                <a16:creationId xmlns:a16="http://schemas.microsoft.com/office/drawing/2014/main" id="{CA37C721-241F-45CF-8E26-5CCD2CEC25F0}"/>
+              </a:ext>
+            </a:extLst>
+          </p:cNvPr>
+          <p:cNvSpPr txBox="1"/>
+          <p:nvPr/>
+        </p:nvSpPr>
+        <p:spPr>
+          <a:xfrm>
+            <a:off x="8083491" y="5777667"/>
+            <a:ext cx="538609" cy="369332"/>
+          </a:xfrm>
+          <a:prstGeom prst="rect">
+            <a:avLst/>
+          </a:prstGeom>
+          <a:noFill/>
+        </p:spPr>
+        <p:txBody>
+          <a:bodyPr wrap="none" lIns="0" rIns="0" rtlCol="0">
+            <a:spAutoFit/>
+          </a:bodyPr>
+          <a:lstStyle/>
+          <a:p>
+            <a:pPr>
+              <a:spcAft>
+                <a:spcPts val="1000"/>
+              </a:spcAft>
+              <a:buClr>
+                <a:schemeClr val="tx2"/>
+              </a:buClr>
+              <a:buSzPct val="80000"/>
+            </a:pPr>
+            <a:r>
+              <a:rPr lang="en-GB" b="1" dirty="0">
+                <a:solidFill>
+                  <a:srgbClr val="00B050"/>
+                </a:solidFill>
+              </a:rPr>
+              <a:t>RQ 3</a:t>
+            </a:r>
+            <a:endParaRPr lang="LID4096" b="1" dirty="0" err="1">
+              <a:solidFill>
+                <a:srgbClr val="00B050"/>
+              </a:solidFill>
+            </a:endParaRPr>
+          </a:p>
+        </p:txBody>
+      </p:sp>
     </p:spTree>
     <p:extLst>
       <p:ext uri="{BB962C8B-B14F-4D97-AF65-F5344CB8AC3E}">
         <p14:creationId xmlns:p14="http://schemas.microsoft.com/office/powerpoint/2010/main" val="2976832284"/>
-      </p:ext>
-    </p:extLst>
-  </p:cSld>
-  <p:clrMapOvr>
-    <a:masterClrMapping/>
-  </p:clrMapOvr>
-</p:sld>
-</file>
-
-<file path=ppt/slides/slide23.xml><?xml version="1.0" encoding="utf-8"?>
-<p:sld xmlns:a="http://schemas.openxmlformats.org/drawingml/2006/main" xmlns:r="http://schemas.openxmlformats.org/officeDocument/2006/relationships" xmlns:p="http://schemas.openxmlformats.org/presentationml/2006/main">
-  <p:cSld>
-    <p:spTree>
-      <p:nvGrpSpPr>
-        <p:cNvPr id="1" name=""/>
-        <p:cNvGrpSpPr/>
-        <p:nvPr/>
-      </p:nvGrpSpPr>
-      <p:grpSpPr>
-        <a:xfrm>
-          <a:off x="0" y="0"/>
-          <a:ext cx="0" cy="0"/>
-          <a:chOff x="0" y="0"/>
-          <a:chExt cx="0" cy="0"/>
-        </a:xfrm>
-      </p:grpSpPr>
-      <p:sp>
-        <p:nvSpPr>
-          <p:cNvPr id="2" name="Titel 1"/>
-          <p:cNvSpPr>
-            <a:spLocks noGrp="1"/>
-          </p:cNvSpPr>
-          <p:nvPr>
-            <p:ph type="title"/>
-          </p:nvPr>
-        </p:nvSpPr>
-        <p:spPr/>
-        <p:txBody>
-          <a:bodyPr/>
-          <a:lstStyle/>
-          <a:p>
-            <a:r>
-              <a:rPr lang="de-DE" dirty="0">
-                <a:solidFill>
-                  <a:schemeClr val="tx2"/>
-                </a:solidFill>
-              </a:rPr>
-              <a:t>Our Approaches</a:t>
-            </a:r>
-          </a:p>
-        </p:txBody>
-      </p:sp>
-      <p:sp>
-        <p:nvSpPr>
-          <p:cNvPr id="4" name="Foliennummernplatzhalter 3"/>
-          <p:cNvSpPr>
-            <a:spLocks noGrp="1"/>
-          </p:cNvSpPr>
-          <p:nvPr>
-            <p:ph type="sldNum" sz="quarter" idx="11"/>
-          </p:nvPr>
-        </p:nvSpPr>
-        <p:spPr/>
-        <p:txBody>
-          <a:bodyPr/>
-          <a:lstStyle/>
-          <a:p>
-            <a:fld id="{815DB69B-0A2B-4D0B-A3BD-360AAA24381D}" type="slidenum">
-              <a:rPr lang="de-DE" smtClean="0"/>
-              <a:pPr/>
-              <a:t>23</a:t>
-            </a:fld>
-            <a:endParaRPr lang="de-DE" dirty="0"/>
-          </a:p>
-        </p:txBody>
-      </p:sp>
-      <p:sp>
-        <p:nvSpPr>
-          <p:cNvPr id="5" name="Textplatzhalter 4"/>
-          <p:cNvSpPr>
-            <a:spLocks noGrp="1"/>
-          </p:cNvSpPr>
-          <p:nvPr>
-            <p:ph type="body" sz="quarter" idx="12"/>
-          </p:nvPr>
-        </p:nvSpPr>
-        <p:spPr/>
-        <p:txBody>
-          <a:bodyPr/>
-          <a:lstStyle/>
-          <a:p>
-            <a:r>
-              <a:rPr lang="de-DE" dirty="0"/>
-              <a:t>Issue tracker</a:t>
-            </a:r>
-          </a:p>
-          <a:p>
-            <a:endParaRPr lang="de-DE" dirty="0"/>
-          </a:p>
-          <a:p>
-            <a:pPr marL="0" indent="0">
-              <a:buNone/>
-            </a:pPr>
-            <a:r>
-              <a:rPr lang="en-GB" dirty="0" err="1"/>
-              <a:t>Baysal</a:t>
-            </a:r>
-            <a:r>
-              <a:rPr lang="en-GB" dirty="0"/>
-              <a:t> et. al. :</a:t>
-            </a:r>
-          </a:p>
-          <a:p>
-            <a:endParaRPr lang="en-GB" dirty="0"/>
-          </a:p>
-          <a:p>
-            <a:pPr lvl="1">
-              <a:buFont typeface="Wingdings" panose="05000000000000000000" pitchFamily="2" charset="2"/>
-              <a:buChar char="§"/>
-            </a:pPr>
-            <a:r>
-              <a:rPr lang="en-GB" dirty="0"/>
-              <a:t>Information overload </a:t>
-            </a:r>
-          </a:p>
-          <a:p>
-            <a:pPr lvl="1">
-              <a:buFont typeface="Wingdings" panose="05000000000000000000" pitchFamily="2" charset="2"/>
-              <a:buChar char="§"/>
-            </a:pPr>
-            <a:r>
-              <a:rPr lang="en-GB" dirty="0"/>
-              <a:t>Expressiveness </a:t>
-            </a:r>
-          </a:p>
-          <a:p>
-            <a:pPr lvl="1">
-              <a:buFont typeface="Wingdings" panose="05000000000000000000" pitchFamily="2" charset="2"/>
-              <a:buChar char="§"/>
-            </a:pPr>
-            <a:endParaRPr lang="en-GB" dirty="0"/>
-          </a:p>
-          <a:p>
-            <a:pPr marL="0" indent="0">
-              <a:buNone/>
-            </a:pPr>
-            <a:r>
-              <a:rPr lang="en-GB" dirty="0"/>
-              <a:t>Ideal to describe the priory as per team decision instead of personal choice.  </a:t>
-            </a:r>
-          </a:p>
-          <a:p>
-            <a:pPr marL="0" indent="0">
-              <a:buNone/>
-            </a:pPr>
-            <a:endParaRPr lang="de-DE" dirty="0"/>
-          </a:p>
-        </p:txBody>
-      </p:sp>
-      <p:sp>
-        <p:nvSpPr>
-          <p:cNvPr id="3" name="Fußzeilenplatzhalter 2"/>
-          <p:cNvSpPr>
-            <a:spLocks noGrp="1"/>
-          </p:cNvSpPr>
-          <p:nvPr>
-            <p:ph type="ftr" sz="quarter" idx="10"/>
-          </p:nvPr>
-        </p:nvSpPr>
-        <p:spPr/>
-        <p:txBody>
-          <a:bodyPr/>
-          <a:lstStyle/>
-          <a:p>
-            <a:r>
-              <a:rPr lang="de-DE"/>
-              <a:t>Software Engineering</a:t>
-            </a:r>
-            <a:endParaRPr lang="de-DE" dirty="0"/>
-          </a:p>
-        </p:txBody>
-      </p:sp>
-      <p:pic>
-        <p:nvPicPr>
-          <p:cNvPr id="6" name="Picture 5" descr="A close up of a logo&#10;&#10;Description automatically generated">
-            <a:extLst>
-              <a:ext uri="{FF2B5EF4-FFF2-40B4-BE49-F238E27FC236}">
-                <a16:creationId xmlns:a16="http://schemas.microsoft.com/office/drawing/2014/main" id="{9D91CC95-7BCB-4DC1-98E4-1240A074794B}"/>
-              </a:ext>
-            </a:extLst>
-          </p:cNvPr>
-          <p:cNvPicPr>
-            <a:picLocks noChangeAspect="1"/>
-          </p:cNvPicPr>
-          <p:nvPr/>
-        </p:nvPicPr>
-        <p:blipFill>
-          <a:blip r:embed="rId2" cstate="print">
-            <a:extLst>
-              <a:ext uri="{28A0092B-C50C-407E-A947-70E740481C1C}">
-                <a14:useLocalDpi xmlns:a14="http://schemas.microsoft.com/office/drawing/2010/main" val="0"/>
-              </a:ext>
-            </a:extLst>
-          </a:blip>
-          <a:stretch>
-            <a:fillRect/>
-          </a:stretch>
-        </p:blipFill>
-        <p:spPr>
-          <a:xfrm>
-            <a:off x="7329264" y="4406446"/>
-            <a:ext cx="1169574" cy="1383987"/>
-          </a:xfrm>
-          <a:prstGeom prst="rect">
-            <a:avLst/>
-          </a:prstGeom>
-        </p:spPr>
-      </p:pic>
-    </p:spTree>
-    <p:extLst>
-      <p:ext uri="{BB962C8B-B14F-4D97-AF65-F5344CB8AC3E}">
-        <p14:creationId xmlns:p14="http://schemas.microsoft.com/office/powerpoint/2010/main" val="1147838235"/>
       </p:ext>
     </p:extLst>
   </p:cSld>
@@ -33811,6 +34047,281 @@
               <a:rPr lang="de-DE" smtClean="0"/>
               <a:pPr/>
               <a:t>24</a:t>
+            </a:fld>
+            <a:endParaRPr lang="de-DE" dirty="0"/>
+          </a:p>
+        </p:txBody>
+      </p:sp>
+      <p:sp>
+        <p:nvSpPr>
+          <p:cNvPr id="5" name="Textplatzhalter 4"/>
+          <p:cNvSpPr>
+            <a:spLocks noGrp="1"/>
+          </p:cNvSpPr>
+          <p:nvPr>
+            <p:ph type="body" sz="quarter" idx="12"/>
+          </p:nvPr>
+        </p:nvSpPr>
+        <p:spPr/>
+        <p:txBody>
+          <a:bodyPr/>
+          <a:lstStyle/>
+          <a:p>
+            <a:r>
+              <a:rPr lang="de-DE" dirty="0"/>
+              <a:t>Issue tracker</a:t>
+            </a:r>
+          </a:p>
+          <a:p>
+            <a:endParaRPr lang="de-DE" dirty="0"/>
+          </a:p>
+          <a:p>
+            <a:pPr marL="0" indent="0">
+              <a:buNone/>
+            </a:pPr>
+            <a:r>
+              <a:rPr lang="en-GB" dirty="0" err="1"/>
+              <a:t>Baysal</a:t>
+            </a:r>
+            <a:r>
+              <a:rPr lang="en-GB" dirty="0"/>
+              <a:t> et. al. :</a:t>
+            </a:r>
+          </a:p>
+          <a:p>
+            <a:endParaRPr lang="en-GB" dirty="0"/>
+          </a:p>
+          <a:p>
+            <a:pPr lvl="1">
+              <a:buFont typeface="Wingdings" panose="05000000000000000000" pitchFamily="2" charset="2"/>
+              <a:buChar char="§"/>
+            </a:pPr>
+            <a:r>
+              <a:rPr lang="en-GB" dirty="0"/>
+              <a:t>Information overload </a:t>
+            </a:r>
+          </a:p>
+          <a:p>
+            <a:pPr lvl="1">
+              <a:buFont typeface="Wingdings" panose="05000000000000000000" pitchFamily="2" charset="2"/>
+              <a:buChar char="§"/>
+            </a:pPr>
+            <a:r>
+              <a:rPr lang="en-GB" dirty="0"/>
+              <a:t>Expressiveness </a:t>
+            </a:r>
+          </a:p>
+          <a:p>
+            <a:pPr lvl="1">
+              <a:buFont typeface="Wingdings" panose="05000000000000000000" pitchFamily="2" charset="2"/>
+              <a:buChar char="§"/>
+            </a:pPr>
+            <a:endParaRPr lang="en-GB" dirty="0"/>
+          </a:p>
+          <a:p>
+            <a:pPr marL="0" indent="0">
+              <a:buNone/>
+            </a:pPr>
+            <a:r>
+              <a:rPr lang="en-GB" dirty="0"/>
+              <a:t>Ideal to describe the priory as per team decision instead of personal choice.  </a:t>
+            </a:r>
+          </a:p>
+          <a:p>
+            <a:pPr marL="0" indent="0">
+              <a:buNone/>
+            </a:pPr>
+            <a:endParaRPr lang="de-DE" dirty="0"/>
+          </a:p>
+        </p:txBody>
+      </p:sp>
+      <p:sp>
+        <p:nvSpPr>
+          <p:cNvPr id="3" name="Fußzeilenplatzhalter 2"/>
+          <p:cNvSpPr>
+            <a:spLocks noGrp="1"/>
+          </p:cNvSpPr>
+          <p:nvPr>
+            <p:ph type="ftr" sz="quarter" idx="10"/>
+          </p:nvPr>
+        </p:nvSpPr>
+        <p:spPr/>
+        <p:txBody>
+          <a:bodyPr/>
+          <a:lstStyle/>
+          <a:p>
+            <a:r>
+              <a:rPr lang="de-DE"/>
+              <a:t>Software Engineering</a:t>
+            </a:r>
+            <a:endParaRPr lang="de-DE" dirty="0"/>
+          </a:p>
+        </p:txBody>
+      </p:sp>
+      <p:pic>
+        <p:nvPicPr>
+          <p:cNvPr id="6" name="Picture 5" descr="A close up of a logo&#10;&#10;Description automatically generated">
+            <a:extLst>
+              <a:ext uri="{FF2B5EF4-FFF2-40B4-BE49-F238E27FC236}">
+                <a16:creationId xmlns:a16="http://schemas.microsoft.com/office/drawing/2014/main" id="{9D91CC95-7BCB-4DC1-98E4-1240A074794B}"/>
+              </a:ext>
+            </a:extLst>
+          </p:cNvPr>
+          <p:cNvPicPr>
+            <a:picLocks noChangeAspect="1"/>
+          </p:cNvPicPr>
+          <p:nvPr/>
+        </p:nvPicPr>
+        <p:blipFill>
+          <a:blip r:embed="rId2" cstate="print">
+            <a:extLst>
+              <a:ext uri="{28A0092B-C50C-407E-A947-70E740481C1C}">
+                <a14:useLocalDpi xmlns:a14="http://schemas.microsoft.com/office/drawing/2010/main" val="0"/>
+              </a:ext>
+            </a:extLst>
+          </a:blip>
+          <a:stretch>
+            <a:fillRect/>
+          </a:stretch>
+        </p:blipFill>
+        <p:spPr>
+          <a:xfrm>
+            <a:off x="7329264" y="4406446"/>
+            <a:ext cx="1169574" cy="1383987"/>
+          </a:xfrm>
+          <a:prstGeom prst="rect">
+            <a:avLst/>
+          </a:prstGeom>
+        </p:spPr>
+      </p:pic>
+      <p:sp>
+        <p:nvSpPr>
+          <p:cNvPr id="7" name="TextBox 6">
+            <a:extLst>
+              <a:ext uri="{FF2B5EF4-FFF2-40B4-BE49-F238E27FC236}">
+                <a16:creationId xmlns:a16="http://schemas.microsoft.com/office/drawing/2014/main" id="{B4B899BD-D79C-448F-8E8E-5DE6831DDA3A}"/>
+              </a:ext>
+            </a:extLst>
+          </p:cNvPr>
+          <p:cNvSpPr txBox="1"/>
+          <p:nvPr/>
+        </p:nvSpPr>
+        <p:spPr>
+          <a:xfrm>
+            <a:off x="8258774" y="5337113"/>
+            <a:ext cx="538609" cy="369332"/>
+          </a:xfrm>
+          <a:prstGeom prst="rect">
+            <a:avLst/>
+          </a:prstGeom>
+          <a:noFill/>
+        </p:spPr>
+        <p:txBody>
+          <a:bodyPr wrap="none" lIns="0" rIns="0" rtlCol="0">
+            <a:spAutoFit/>
+          </a:bodyPr>
+          <a:lstStyle/>
+          <a:p>
+            <a:pPr>
+              <a:spcAft>
+                <a:spcPts val="1000"/>
+              </a:spcAft>
+              <a:buClr>
+                <a:schemeClr val="tx2"/>
+              </a:buClr>
+              <a:buSzPct val="80000"/>
+            </a:pPr>
+            <a:r>
+              <a:rPr lang="en-GB" b="1" dirty="0">
+                <a:solidFill>
+                  <a:srgbClr val="00B050"/>
+                </a:solidFill>
+              </a:rPr>
+              <a:t>RQ 1</a:t>
+            </a:r>
+            <a:endParaRPr lang="LID4096" b="1" dirty="0" err="1">
+              <a:solidFill>
+                <a:srgbClr val="00B050"/>
+              </a:solidFill>
+            </a:endParaRPr>
+          </a:p>
+        </p:txBody>
+      </p:sp>
+    </p:spTree>
+    <p:extLst>
+      <p:ext uri="{BB962C8B-B14F-4D97-AF65-F5344CB8AC3E}">
+        <p14:creationId xmlns:p14="http://schemas.microsoft.com/office/powerpoint/2010/main" val="1147838235"/>
+      </p:ext>
+    </p:extLst>
+  </p:cSld>
+  <p:clrMapOvr>
+    <a:masterClrMapping/>
+  </p:clrMapOvr>
+</p:sld>
+</file>
+
+<file path=ppt/slides/slide25.xml><?xml version="1.0" encoding="utf-8"?>
+<p:sld xmlns:a="http://schemas.openxmlformats.org/drawingml/2006/main" xmlns:r="http://schemas.openxmlformats.org/officeDocument/2006/relationships" xmlns:p="http://schemas.openxmlformats.org/presentationml/2006/main">
+  <p:cSld>
+    <p:spTree>
+      <p:nvGrpSpPr>
+        <p:cNvPr id="1" name=""/>
+        <p:cNvGrpSpPr/>
+        <p:nvPr/>
+      </p:nvGrpSpPr>
+      <p:grpSpPr>
+        <a:xfrm>
+          <a:off x="0" y="0"/>
+          <a:ext cx="0" cy="0"/>
+          <a:chOff x="0" y="0"/>
+          <a:chExt cx="0" cy="0"/>
+        </a:xfrm>
+      </p:grpSpPr>
+      <p:sp>
+        <p:nvSpPr>
+          <p:cNvPr id="2" name="Titel 1"/>
+          <p:cNvSpPr>
+            <a:spLocks noGrp="1"/>
+          </p:cNvSpPr>
+          <p:nvPr>
+            <p:ph type="title"/>
+          </p:nvPr>
+        </p:nvSpPr>
+        <p:spPr/>
+        <p:txBody>
+          <a:bodyPr/>
+          <a:lstStyle/>
+          <a:p>
+            <a:r>
+              <a:rPr lang="de-DE" dirty="0">
+                <a:solidFill>
+                  <a:schemeClr val="tx2"/>
+                </a:solidFill>
+              </a:rPr>
+              <a:t>Our Approaches</a:t>
+            </a:r>
+          </a:p>
+        </p:txBody>
+      </p:sp>
+      <p:sp>
+        <p:nvSpPr>
+          <p:cNvPr id="4" name="Foliennummernplatzhalter 3"/>
+          <p:cNvSpPr>
+            <a:spLocks noGrp="1"/>
+          </p:cNvSpPr>
+          <p:nvPr>
+            <p:ph type="sldNum" sz="quarter" idx="11"/>
+          </p:nvPr>
+        </p:nvSpPr>
+        <p:spPr/>
+        <p:txBody>
+          <a:bodyPr/>
+          <a:lstStyle/>
+          <a:p>
+            <a:fld id="{815DB69B-0A2B-4D0B-A3BD-360AAA24381D}" type="slidenum">
+              <a:rPr lang="de-DE" smtClean="0"/>
+              <a:pPr/>
+              <a:t>25</a:t>
             </a:fld>
             <a:endParaRPr lang="de-DE" dirty="0"/>
           </a:p>
@@ -33967,149 +34478,63 @@
           </a:prstGeom>
         </p:spPr>
       </p:pic>
+      <p:sp>
+        <p:nvSpPr>
+          <p:cNvPr id="8" name="TextBox 7">
+            <a:extLst>
+              <a:ext uri="{FF2B5EF4-FFF2-40B4-BE49-F238E27FC236}">
+                <a16:creationId xmlns:a16="http://schemas.microsoft.com/office/drawing/2014/main" id="{A3BA382D-FE9E-4017-A20D-6262B60732AF}"/>
+              </a:ext>
+            </a:extLst>
+          </p:cNvPr>
+          <p:cNvSpPr txBox="1"/>
+          <p:nvPr/>
+        </p:nvSpPr>
+        <p:spPr>
+          <a:xfrm>
+            <a:off x="7751469" y="2482302"/>
+            <a:ext cx="538609" cy="369332"/>
+          </a:xfrm>
+          <a:prstGeom prst="rect">
+            <a:avLst/>
+          </a:prstGeom>
+          <a:noFill/>
+        </p:spPr>
+        <p:txBody>
+          <a:bodyPr wrap="none" lIns="0" rIns="0" rtlCol="0">
+            <a:spAutoFit/>
+          </a:bodyPr>
+          <a:lstStyle/>
+          <a:p>
+            <a:pPr>
+              <a:spcAft>
+                <a:spcPts val="1000"/>
+              </a:spcAft>
+              <a:buClr>
+                <a:schemeClr val="tx2"/>
+              </a:buClr>
+              <a:buSzPct val="80000"/>
+            </a:pPr>
+            <a:r>
+              <a:rPr lang="en-GB" b="1" dirty="0">
+                <a:solidFill>
+                  <a:srgbClr val="00B050"/>
+                </a:solidFill>
+              </a:rPr>
+              <a:t>RQ 1</a:t>
+            </a:r>
+            <a:endParaRPr lang="LID4096" b="1" dirty="0" err="1">
+              <a:solidFill>
+                <a:srgbClr val="00B050"/>
+              </a:solidFill>
+            </a:endParaRPr>
+          </a:p>
+        </p:txBody>
+      </p:sp>
     </p:spTree>
     <p:extLst>
       <p:ext uri="{BB962C8B-B14F-4D97-AF65-F5344CB8AC3E}">
         <p14:creationId xmlns:p14="http://schemas.microsoft.com/office/powerpoint/2010/main" val="3449848190"/>
-      </p:ext>
-    </p:extLst>
-  </p:cSld>
-  <p:clrMapOvr>
-    <a:masterClrMapping/>
-  </p:clrMapOvr>
-</p:sld>
-</file>
-
-<file path=ppt/slides/slide25.xml><?xml version="1.0" encoding="utf-8"?>
-<p:sld xmlns:a="http://schemas.openxmlformats.org/drawingml/2006/main" xmlns:r="http://schemas.openxmlformats.org/officeDocument/2006/relationships" xmlns:p="http://schemas.openxmlformats.org/presentationml/2006/main">
-  <p:cSld>
-    <p:spTree>
-      <p:nvGrpSpPr>
-        <p:cNvPr id="1" name=""/>
-        <p:cNvGrpSpPr/>
-        <p:nvPr/>
-      </p:nvGrpSpPr>
-      <p:grpSpPr>
-        <a:xfrm>
-          <a:off x="0" y="0"/>
-          <a:ext cx="0" cy="0"/>
-          <a:chOff x="0" y="0"/>
-          <a:chExt cx="0" cy="0"/>
-        </a:xfrm>
-      </p:grpSpPr>
-      <p:sp>
-        <p:nvSpPr>
-          <p:cNvPr id="2" name="Titel 1"/>
-          <p:cNvSpPr>
-            <a:spLocks noGrp="1"/>
-          </p:cNvSpPr>
-          <p:nvPr>
-            <p:ph type="title"/>
-          </p:nvPr>
-        </p:nvSpPr>
-        <p:spPr/>
-        <p:txBody>
-          <a:bodyPr/>
-          <a:lstStyle/>
-          <a:p>
-            <a:r>
-              <a:rPr lang="de-DE" dirty="0">
-                <a:solidFill>
-                  <a:schemeClr val="tx2"/>
-                </a:solidFill>
-              </a:rPr>
-              <a:t>UX Design Cycle</a:t>
-            </a:r>
-          </a:p>
-        </p:txBody>
-      </p:sp>
-      <p:sp>
-        <p:nvSpPr>
-          <p:cNvPr id="4" name="Foliennummernplatzhalter 3"/>
-          <p:cNvSpPr>
-            <a:spLocks noGrp="1"/>
-          </p:cNvSpPr>
-          <p:nvPr>
-            <p:ph type="sldNum" sz="quarter" idx="11"/>
-          </p:nvPr>
-        </p:nvSpPr>
-        <p:spPr/>
-        <p:txBody>
-          <a:bodyPr/>
-          <a:lstStyle/>
-          <a:p>
-            <a:fld id="{815DB69B-0A2B-4D0B-A3BD-360AAA24381D}" type="slidenum">
-              <a:rPr lang="de-DE" smtClean="0"/>
-              <a:pPr/>
-              <a:t>25</a:t>
-            </a:fld>
-            <a:endParaRPr lang="de-DE" dirty="0"/>
-          </a:p>
-        </p:txBody>
-      </p:sp>
-      <p:sp>
-        <p:nvSpPr>
-          <p:cNvPr id="3" name="Fußzeilenplatzhalter 2"/>
-          <p:cNvSpPr>
-            <a:spLocks noGrp="1"/>
-          </p:cNvSpPr>
-          <p:nvPr>
-            <p:ph type="ftr" sz="quarter" idx="10"/>
-          </p:nvPr>
-        </p:nvSpPr>
-        <p:spPr/>
-        <p:txBody>
-          <a:bodyPr/>
-          <a:lstStyle/>
-          <a:p>
-            <a:r>
-              <a:rPr lang="de-DE"/>
-              <a:t>Software Engineering</a:t>
-            </a:r>
-            <a:endParaRPr lang="de-DE" dirty="0"/>
-          </a:p>
-        </p:txBody>
-      </p:sp>
-      <p:pic>
-        <p:nvPicPr>
-          <p:cNvPr id="7" name="Picture 6" descr="A close up of a logo&#10;&#10;Description automatically generated">
-            <a:extLst>
-              <a:ext uri="{FF2B5EF4-FFF2-40B4-BE49-F238E27FC236}">
-                <a16:creationId xmlns:a16="http://schemas.microsoft.com/office/drawing/2014/main" id="{8269BFC5-F04C-47E7-A8B1-51CDB2571100}"/>
-              </a:ext>
-            </a:extLst>
-          </p:cNvPr>
-          <p:cNvPicPr>
-            <a:picLocks noChangeAspect="1"/>
-          </p:cNvPicPr>
-          <p:nvPr/>
-        </p:nvPicPr>
-        <p:blipFill>
-          <a:blip r:embed="rId2">
-            <a:extLst>
-              <a:ext uri="{28A0092B-C50C-407E-A947-70E740481C1C}">
-                <a14:useLocalDpi xmlns:a14="http://schemas.microsoft.com/office/drawing/2010/main" val="0"/>
-              </a:ext>
-            </a:extLst>
-          </a:blip>
-          <a:stretch>
-            <a:fillRect/>
-          </a:stretch>
-        </p:blipFill>
-        <p:spPr>
-          <a:xfrm>
-            <a:off x="2315647" y="1533405"/>
-            <a:ext cx="5011976" cy="4263679"/>
-          </a:xfrm>
-          <a:prstGeom prst="rect">
-            <a:avLst/>
-          </a:prstGeom>
-        </p:spPr>
-      </p:pic>
-    </p:spTree>
-    <p:extLst>
-      <p:ext uri="{BB962C8B-B14F-4D97-AF65-F5344CB8AC3E}">
-        <p14:creationId xmlns:p14="http://schemas.microsoft.com/office/powerpoint/2010/main" val="2449660059"/>
       </p:ext>
     </p:extLst>
   </p:cSld>

</xml_diff>

<commit_message>
Cites multiple tools research trends
</commit_message>
<xml_diff>
--- a/docs/slides/Proposal presentation _ dry run.pptx
+++ b/docs/slides/Proposal presentation _ dry run.pptx
@@ -3291,7 +3291,7 @@
               <a:pPr>
                 <a:defRPr/>
               </a:pPr>
-              <a:t>21.04.2019</a:t>
+              <a:t>22.04.2019</a:t>
             </a:fld>
             <a:endParaRPr lang="de-DE"/>
           </a:p>
@@ -3507,7 +3507,7 @@
               <a:pPr>
                 <a:defRPr/>
               </a:pPr>
-              <a:t>21.04.2019</a:t>
+              <a:t>22.04.2019</a:t>
             </a:fld>
             <a:endParaRPr lang="de-DE"/>
           </a:p>
@@ -39444,7 +39444,7 @@
             </a:pPr>
             <a:r>
               <a:rPr lang="en-GB" dirty="0"/>
-              <a:t>IDE Notifications, </a:t>
+              <a:t>IDE Notifications </a:t>
             </a:r>
           </a:p>
           <a:p>
@@ -39454,7 +39454,7 @@
             </a:pPr>
             <a:r>
               <a:rPr lang="en-GB" dirty="0"/>
-              <a:t>IDE tools, </a:t>
+              <a:t>IDE tools </a:t>
             </a:r>
           </a:p>
           <a:p>
@@ -39463,9 +39463,10 @@
               <a:buChar char="•"/>
             </a:pPr>
             <a:r>
-              <a:rPr lang="en-GB" dirty="0"/>
-              <a:t>Dedicated tools, </a:t>
-            </a:r>
+              <a:rPr lang="en-GB"/>
+              <a:t>Dedicated tools </a:t>
+            </a:r>
+            <a:endParaRPr lang="en-GB" dirty="0"/>
           </a:p>
           <a:p>
             <a:pPr lvl="1">
@@ -40219,6 +40220,15 @@
             </a:r>
           </a:p>
           <a:p>
+            <a:pPr marL="0" indent="0" algn="r">
+              <a:buNone/>
+            </a:pPr>
+            <a:r>
+              <a:rPr lang="en-GB" dirty="0"/>
+              <a:t>( Lori et. al. )</a:t>
+            </a:r>
+          </a:p>
+          <a:p>
             <a:pPr>
               <a:buFont typeface="Arial" panose="020B0604020202020204" pitchFamily="34" charset="0"/>
               <a:buChar char="•"/>
@@ -40239,7 +40249,16 @@
             </a:br>
             <a:r>
               <a:rPr lang="en-GB" dirty="0"/>
-              <a:t>Java and merges them together in order to show warnings to the developer</a:t>
+              <a:t>Java and merges them together in order to show warnings to the developer.</a:t>
+            </a:r>
+          </a:p>
+          <a:p>
+            <a:pPr marL="0" indent="0" algn="r">
+              <a:buNone/>
+            </a:pPr>
+            <a:r>
+              <a:rPr lang="en-GB" dirty="0"/>
+              <a:t>( Na Meng et. al. )</a:t>
             </a:r>
           </a:p>
           <a:p>

</xml_diff>